<commit_message>
Site updated: 2020-08-14 12:39:42
</commit_message>
<xml_diff>
--- a/2020/08/08/LeetCode-对称二叉树/新建 Microsoft PowerPoint 演示文稿.pptx
+++ b/2020/08/08/LeetCode-对称二叉树/新建 Microsoft PowerPoint 演示文稿.pptx
@@ -104,6 +104,11 @@
       </a:defRPr>
     </a:lvl9pPr>
   </p:defaultTextStyle>
+  <p:extLst>
+    <p:ext uri="{EFAFB233-063F-42B5-8137-9DF3F51BA10A}">
+      <p15:sldGuideLst xmlns:p15="http://schemas.microsoft.com/office/powerpoint/2012/main"/>
+    </p:ext>
+  </p:extLst>
 </p:presentation>
 </file>
 
@@ -254,7 +259,7 @@
           <a:p>
             <a:fld id="{F1AD5C5A-15F3-40B4-B31E-DF89F0F32C55}" type="datetimeFigureOut">
               <a:rPr lang="zh-CN" altLang="en-US" smtClean="0"/>
-              <a:t>2020/8/7</a:t>
+              <a:t>2020/8/8</a:t>
             </a:fld>
             <a:endParaRPr lang="zh-CN" altLang="en-US"/>
           </a:p>
@@ -452,7 +457,7 @@
           <a:p>
             <a:fld id="{F1AD5C5A-15F3-40B4-B31E-DF89F0F32C55}" type="datetimeFigureOut">
               <a:rPr lang="zh-CN" altLang="en-US" smtClean="0"/>
-              <a:t>2020/8/7</a:t>
+              <a:t>2020/8/8</a:t>
             </a:fld>
             <a:endParaRPr lang="zh-CN" altLang="en-US"/>
           </a:p>
@@ -660,7 +665,7 @@
           <a:p>
             <a:fld id="{F1AD5C5A-15F3-40B4-B31E-DF89F0F32C55}" type="datetimeFigureOut">
               <a:rPr lang="zh-CN" altLang="en-US" smtClean="0"/>
-              <a:t>2020/8/7</a:t>
+              <a:t>2020/8/8</a:t>
             </a:fld>
             <a:endParaRPr lang="zh-CN" altLang="en-US"/>
           </a:p>
@@ -858,7 +863,7 @@
           <a:p>
             <a:fld id="{F1AD5C5A-15F3-40B4-B31E-DF89F0F32C55}" type="datetimeFigureOut">
               <a:rPr lang="zh-CN" altLang="en-US" smtClean="0"/>
-              <a:t>2020/8/7</a:t>
+              <a:t>2020/8/8</a:t>
             </a:fld>
             <a:endParaRPr lang="zh-CN" altLang="en-US"/>
           </a:p>
@@ -1133,7 +1138,7 @@
           <a:p>
             <a:fld id="{F1AD5C5A-15F3-40B4-B31E-DF89F0F32C55}" type="datetimeFigureOut">
               <a:rPr lang="zh-CN" altLang="en-US" smtClean="0"/>
-              <a:t>2020/8/7</a:t>
+              <a:t>2020/8/8</a:t>
             </a:fld>
             <a:endParaRPr lang="zh-CN" altLang="en-US"/>
           </a:p>
@@ -1398,7 +1403,7 @@
           <a:p>
             <a:fld id="{F1AD5C5A-15F3-40B4-B31E-DF89F0F32C55}" type="datetimeFigureOut">
               <a:rPr lang="zh-CN" altLang="en-US" smtClean="0"/>
-              <a:t>2020/8/7</a:t>
+              <a:t>2020/8/8</a:t>
             </a:fld>
             <a:endParaRPr lang="zh-CN" altLang="en-US"/>
           </a:p>
@@ -1810,7 +1815,7 @@
           <a:p>
             <a:fld id="{F1AD5C5A-15F3-40B4-B31E-DF89F0F32C55}" type="datetimeFigureOut">
               <a:rPr lang="zh-CN" altLang="en-US" smtClean="0"/>
-              <a:t>2020/8/7</a:t>
+              <a:t>2020/8/8</a:t>
             </a:fld>
             <a:endParaRPr lang="zh-CN" altLang="en-US"/>
           </a:p>
@@ -1951,7 +1956,7 @@
           <a:p>
             <a:fld id="{F1AD5C5A-15F3-40B4-B31E-DF89F0F32C55}" type="datetimeFigureOut">
               <a:rPr lang="zh-CN" altLang="en-US" smtClean="0"/>
-              <a:t>2020/8/7</a:t>
+              <a:t>2020/8/8</a:t>
             </a:fld>
             <a:endParaRPr lang="zh-CN" altLang="en-US"/>
           </a:p>
@@ -2064,7 +2069,7 @@
           <a:p>
             <a:fld id="{F1AD5C5A-15F3-40B4-B31E-DF89F0F32C55}" type="datetimeFigureOut">
               <a:rPr lang="zh-CN" altLang="en-US" smtClean="0"/>
-              <a:t>2020/8/7</a:t>
+              <a:t>2020/8/8</a:t>
             </a:fld>
             <a:endParaRPr lang="zh-CN" altLang="en-US"/>
           </a:p>
@@ -2375,7 +2380,7 @@
           <a:p>
             <a:fld id="{F1AD5C5A-15F3-40B4-B31E-DF89F0F32C55}" type="datetimeFigureOut">
               <a:rPr lang="zh-CN" altLang="en-US" smtClean="0"/>
-              <a:t>2020/8/7</a:t>
+              <a:t>2020/8/8</a:t>
             </a:fld>
             <a:endParaRPr lang="zh-CN" altLang="en-US"/>
           </a:p>
@@ -2663,7 +2668,7 @@
           <a:p>
             <a:fld id="{F1AD5C5A-15F3-40B4-B31E-DF89F0F32C55}" type="datetimeFigureOut">
               <a:rPr lang="zh-CN" altLang="en-US" smtClean="0"/>
-              <a:t>2020/8/7</a:t>
+              <a:t>2020/8/8</a:t>
             </a:fld>
             <a:endParaRPr lang="zh-CN" altLang="en-US"/>
           </a:p>
@@ -2904,7 +2909,7 @@
           <a:p>
             <a:fld id="{F1AD5C5A-15F3-40B4-B31E-DF89F0F32C55}" type="datetimeFigureOut">
               <a:rPr lang="zh-CN" altLang="en-US" smtClean="0"/>
-              <a:t>2020/8/7</a:t>
+              <a:t>2020/8/8</a:t>
             </a:fld>
             <a:endParaRPr lang="zh-CN" altLang="en-US"/>
           </a:p>
@@ -3323,10 +3328,10 @@
       </p:grpSpPr>
       <p:grpSp>
         <p:nvGrpSpPr>
-          <p:cNvPr id="52" name="组合 51">
-            <a:extLst>
-              <a:ext uri="{FF2B5EF4-FFF2-40B4-BE49-F238E27FC236}">
-                <a16:creationId xmlns:a16="http://schemas.microsoft.com/office/drawing/2014/main" id="{9335F7FC-AB22-4134-982F-BA519A05FAD7}"/>
+          <p:cNvPr id="27" name="组合 26">
+            <a:extLst>
+              <a:ext uri="{FF2B5EF4-FFF2-40B4-BE49-F238E27FC236}">
+                <a16:creationId xmlns:a16="http://schemas.microsoft.com/office/drawing/2014/main" id="{8C716606-D871-41DB-8AE3-7CDD2639964F}"/>
               </a:ext>
             </a:extLst>
           </p:cNvPr>
@@ -3335,10 +3340,10 @@
         </p:nvGrpSpPr>
         <p:grpSpPr>
           <a:xfrm>
-            <a:off x="2515451" y="1924893"/>
-            <a:ext cx="6087020" cy="3008214"/>
-            <a:chOff x="1959866" y="1948445"/>
-            <a:chExt cx="6087020" cy="3008214"/>
+            <a:off x="3695227" y="1371600"/>
+            <a:ext cx="3611396" cy="3123704"/>
+            <a:chOff x="3695227" y="1371600"/>
+            <a:chExt cx="3611396" cy="3123704"/>
           </a:xfrm>
         </p:grpSpPr>
         <p:sp>
@@ -3355,7 +3360,7 @@
           </p:nvSpPr>
           <p:spPr>
             <a:xfrm>
-              <a:off x="3016966" y="1948447"/>
+              <a:off x="4738877" y="1850250"/>
               <a:ext cx="512447" cy="512447"/>
             </a:xfrm>
             <a:prstGeom prst="ellipse">
@@ -3411,7 +3416,7 @@
           </p:nvSpPr>
           <p:spPr>
             <a:xfrm>
-              <a:off x="2480811" y="2798676"/>
+              <a:off x="4202722" y="2700479"/>
               <a:ext cx="512447" cy="512447"/>
             </a:xfrm>
             <a:prstGeom prst="ellipse">
@@ -3467,7 +3472,353 @@
           </p:nvSpPr>
           <p:spPr>
             <a:xfrm>
-              <a:off x="3563699" y="2798678"/>
+              <a:off x="5285610" y="2700481"/>
+              <a:ext cx="512447" cy="512447"/>
+            </a:xfrm>
+            <a:prstGeom prst="ellipse">
+              <a:avLst/>
+            </a:prstGeom>
+          </p:spPr>
+          <p:style>
+            <a:lnRef idx="2">
+              <a:schemeClr val="accent1">
+                <a:shade val="50000"/>
+              </a:schemeClr>
+            </a:lnRef>
+            <a:fillRef idx="1">
+              <a:schemeClr val="accent1"/>
+            </a:fillRef>
+            <a:effectRef idx="0">
+              <a:schemeClr val="accent1"/>
+            </a:effectRef>
+            <a:fontRef idx="minor">
+              <a:schemeClr val="lt1"/>
+            </a:fontRef>
+          </p:style>
+          <p:txBody>
+            <a:bodyPr rtlCol="0" anchor="ctr"/>
+            <a:lstStyle/>
+            <a:p>
+              <a:pPr algn="ctr"/>
+              <a:r>
+                <a:rPr lang="en-US" altLang="zh-CN" dirty="0">
+                  <a:latin typeface="Arial" panose="020B0604020202020204" pitchFamily="34" charset="0"/>
+                  <a:cs typeface="Arial" panose="020B0604020202020204" pitchFamily="34" charset="0"/>
+                </a:rPr>
+                <a:t>2</a:t>
+              </a:r>
+              <a:endParaRPr lang="zh-CN" altLang="en-US" dirty="0">
+                <a:latin typeface="Arial" panose="020B0604020202020204" pitchFamily="34" charset="0"/>
+                <a:cs typeface="Arial" panose="020B0604020202020204" pitchFamily="34" charset="0"/>
+              </a:endParaRPr>
+            </a:p>
+          </p:txBody>
+        </p:sp>
+        <p:cxnSp>
+          <p:nvCxnSpPr>
+            <p:cNvPr id="18" name="直接连接符 17">
+              <a:extLst>
+                <a:ext uri="{FF2B5EF4-FFF2-40B4-BE49-F238E27FC236}">
+                  <a16:creationId xmlns:a16="http://schemas.microsoft.com/office/drawing/2014/main" id="{1C1FB3D4-FFA5-4148-AB0A-E9E1838E7914}"/>
+                </a:ext>
+              </a:extLst>
+            </p:cNvPr>
+            <p:cNvCxnSpPr>
+              <a:cxnSpLocks/>
+              <a:stCxn id="6" idx="0"/>
+              <a:endCxn id="4" idx="3"/>
+            </p:cNvCxnSpPr>
+            <p:nvPr/>
+          </p:nvCxnSpPr>
+          <p:spPr>
+            <a:xfrm flipV="1">
+              <a:off x="4458946" y="2287651"/>
+              <a:ext cx="354977" cy="412828"/>
+            </a:xfrm>
+            <a:prstGeom prst="line">
+              <a:avLst/>
+            </a:prstGeom>
+          </p:spPr>
+          <p:style>
+            <a:lnRef idx="1">
+              <a:schemeClr val="accent1"/>
+            </a:lnRef>
+            <a:fillRef idx="0">
+              <a:schemeClr val="accent1"/>
+            </a:fillRef>
+            <a:effectRef idx="0">
+              <a:schemeClr val="accent1"/>
+            </a:effectRef>
+            <a:fontRef idx="minor">
+              <a:schemeClr val="tx1"/>
+            </a:fontRef>
+          </p:style>
+        </p:cxnSp>
+        <p:cxnSp>
+          <p:nvCxnSpPr>
+            <p:cNvPr id="21" name="直接连接符 20">
+              <a:extLst>
+                <a:ext uri="{FF2B5EF4-FFF2-40B4-BE49-F238E27FC236}">
+                  <a16:creationId xmlns:a16="http://schemas.microsoft.com/office/drawing/2014/main" id="{0044F30D-E7B8-4F38-8C35-02679A7ADAA8}"/>
+                </a:ext>
+              </a:extLst>
+            </p:cNvPr>
+            <p:cNvCxnSpPr>
+              <a:cxnSpLocks/>
+              <a:stCxn id="4" idx="5"/>
+              <a:endCxn id="8" idx="0"/>
+            </p:cNvCxnSpPr>
+            <p:nvPr/>
+          </p:nvCxnSpPr>
+          <p:spPr>
+            <a:xfrm>
+              <a:off x="5176278" y="2287651"/>
+              <a:ext cx="365556" cy="412830"/>
+            </a:xfrm>
+            <a:prstGeom prst="line">
+              <a:avLst/>
+            </a:prstGeom>
+          </p:spPr>
+          <p:style>
+            <a:lnRef idx="1">
+              <a:schemeClr val="accent1"/>
+            </a:lnRef>
+            <a:fillRef idx="0">
+              <a:schemeClr val="accent1"/>
+            </a:fillRef>
+            <a:effectRef idx="0">
+              <a:schemeClr val="accent1"/>
+            </a:effectRef>
+            <a:fontRef idx="minor">
+              <a:schemeClr val="tx1"/>
+            </a:fontRef>
+          </p:style>
+        </p:cxnSp>
+        <p:sp>
+          <p:nvSpPr>
+            <p:cNvPr id="47" name="文本框 46">
+              <a:extLst>
+                <a:ext uri="{FF2B5EF4-FFF2-40B4-BE49-F238E27FC236}">
+                  <a16:creationId xmlns:a16="http://schemas.microsoft.com/office/drawing/2014/main" id="{DC170A73-20A5-4E3B-B662-4AD3C41EF8E0}"/>
+                </a:ext>
+              </a:extLst>
+            </p:cNvPr>
+            <p:cNvSpPr txBox="1"/>
+            <p:nvPr/>
+          </p:nvSpPr>
+          <p:spPr>
+            <a:xfrm>
+              <a:off x="6416636" y="2830481"/>
+              <a:ext cx="889987" cy="584775"/>
+            </a:xfrm>
+            <a:prstGeom prst="rect">
+              <a:avLst/>
+            </a:prstGeom>
+            <a:noFill/>
+          </p:spPr>
+          <p:txBody>
+            <a:bodyPr wrap="none" rtlCol="0">
+              <a:spAutoFit/>
+            </a:bodyPr>
+            <a:lstStyle/>
+            <a:p>
+              <a:r>
+                <a:rPr lang="en-US" altLang="zh-CN" sz="3200" dirty="0">
+                  <a:latin typeface="Arial" panose="020B0604020202020204" pitchFamily="34" charset="0"/>
+                  <a:cs typeface="Arial" panose="020B0604020202020204" pitchFamily="34" charset="0"/>
+                </a:rPr>
+                <a:t>true</a:t>
+              </a:r>
+              <a:endParaRPr lang="zh-CN" altLang="en-US" sz="3200" dirty="0">
+                <a:latin typeface="Arial" panose="020B0604020202020204" pitchFamily="34" charset="0"/>
+                <a:cs typeface="Arial" panose="020B0604020202020204" pitchFamily="34" charset="0"/>
+              </a:endParaRPr>
+            </a:p>
+          </p:txBody>
+        </p:sp>
+        <p:sp>
+          <p:nvSpPr>
+            <p:cNvPr id="2" name="椭圆 1">
+              <a:extLst>
+                <a:ext uri="{FF2B5EF4-FFF2-40B4-BE49-F238E27FC236}">
+                  <a16:creationId xmlns:a16="http://schemas.microsoft.com/office/drawing/2014/main" id="{44B11B46-75EE-415A-AAE5-8EFFF10FE4F4}"/>
+                </a:ext>
+              </a:extLst>
+            </p:cNvPr>
+            <p:cNvSpPr/>
+            <p:nvPr/>
+          </p:nvSpPr>
+          <p:spPr>
+            <a:xfrm>
+              <a:off x="3695227" y="3692633"/>
+              <a:ext cx="512447" cy="512447"/>
+            </a:xfrm>
+            <a:prstGeom prst="ellipse">
+              <a:avLst/>
+            </a:prstGeom>
+          </p:spPr>
+          <p:style>
+            <a:lnRef idx="2">
+              <a:schemeClr val="accent1">
+                <a:shade val="50000"/>
+              </a:schemeClr>
+            </a:lnRef>
+            <a:fillRef idx="1">
+              <a:schemeClr val="accent1"/>
+            </a:fillRef>
+            <a:effectRef idx="0">
+              <a:schemeClr val="accent1"/>
+            </a:effectRef>
+            <a:fontRef idx="minor">
+              <a:schemeClr val="lt1"/>
+            </a:fontRef>
+          </p:style>
+          <p:txBody>
+            <a:bodyPr rtlCol="0" anchor="ctr"/>
+            <a:lstStyle/>
+            <a:p>
+              <a:pPr algn="ctr"/>
+              <a:r>
+                <a:rPr lang="en-US" altLang="zh-CN" dirty="0">
+                  <a:latin typeface="Arial" panose="020B0604020202020204" pitchFamily="34" charset="0"/>
+                  <a:cs typeface="Arial" panose="020B0604020202020204" pitchFamily="34" charset="0"/>
+                </a:rPr>
+                <a:t>3</a:t>
+              </a:r>
+              <a:endParaRPr lang="zh-CN" altLang="en-US" dirty="0">
+                <a:latin typeface="Arial" panose="020B0604020202020204" pitchFamily="34" charset="0"/>
+                <a:cs typeface="Arial" panose="020B0604020202020204" pitchFamily="34" charset="0"/>
+              </a:endParaRPr>
+            </a:p>
+          </p:txBody>
+        </p:sp>
+        <p:sp>
+          <p:nvSpPr>
+            <p:cNvPr id="3" name="椭圆 2">
+              <a:extLst>
+                <a:ext uri="{FF2B5EF4-FFF2-40B4-BE49-F238E27FC236}">
+                  <a16:creationId xmlns:a16="http://schemas.microsoft.com/office/drawing/2014/main" id="{AD2FACC7-91E4-4C0C-82AE-51A6F28E5E64}"/>
+                </a:ext>
+              </a:extLst>
+            </p:cNvPr>
+            <p:cNvSpPr/>
+            <p:nvPr/>
+          </p:nvSpPr>
+          <p:spPr>
+            <a:xfrm>
+              <a:off x="4458945" y="3692633"/>
+              <a:ext cx="512447" cy="512447"/>
+            </a:xfrm>
+            <a:prstGeom prst="ellipse">
+              <a:avLst/>
+            </a:prstGeom>
+          </p:spPr>
+          <p:style>
+            <a:lnRef idx="2">
+              <a:schemeClr val="accent1">
+                <a:shade val="50000"/>
+              </a:schemeClr>
+            </a:lnRef>
+            <a:fillRef idx="1">
+              <a:schemeClr val="accent1"/>
+            </a:fillRef>
+            <a:effectRef idx="0">
+              <a:schemeClr val="accent1"/>
+            </a:effectRef>
+            <a:fontRef idx="minor">
+              <a:schemeClr val="lt1"/>
+            </a:fontRef>
+          </p:style>
+          <p:txBody>
+            <a:bodyPr rtlCol="0" anchor="ctr"/>
+            <a:lstStyle/>
+            <a:p>
+              <a:pPr algn="ctr"/>
+              <a:r>
+                <a:rPr lang="en-US" altLang="zh-CN" dirty="0">
+                  <a:latin typeface="Arial" panose="020B0604020202020204" pitchFamily="34" charset="0"/>
+                  <a:cs typeface="Arial" panose="020B0604020202020204" pitchFamily="34" charset="0"/>
+                </a:rPr>
+                <a:t>4</a:t>
+              </a:r>
+              <a:endParaRPr lang="zh-CN" altLang="en-US" dirty="0">
+                <a:latin typeface="Arial" panose="020B0604020202020204" pitchFamily="34" charset="0"/>
+                <a:cs typeface="Arial" panose="020B0604020202020204" pitchFamily="34" charset="0"/>
+              </a:endParaRPr>
+            </a:p>
+          </p:txBody>
+        </p:sp>
+        <p:sp>
+          <p:nvSpPr>
+            <p:cNvPr id="5" name="椭圆 4">
+              <a:extLst>
+                <a:ext uri="{FF2B5EF4-FFF2-40B4-BE49-F238E27FC236}">
+                  <a16:creationId xmlns:a16="http://schemas.microsoft.com/office/drawing/2014/main" id="{5502B437-66FE-44FB-BDA1-5C682041A4D7}"/>
+                </a:ext>
+              </a:extLst>
+            </p:cNvPr>
+            <p:cNvSpPr/>
+            <p:nvPr/>
+          </p:nvSpPr>
+          <p:spPr>
+            <a:xfrm>
+              <a:off x="5102832" y="3692633"/>
+              <a:ext cx="512447" cy="512447"/>
+            </a:xfrm>
+            <a:prstGeom prst="ellipse">
+              <a:avLst/>
+            </a:prstGeom>
+          </p:spPr>
+          <p:style>
+            <a:lnRef idx="2">
+              <a:schemeClr val="accent1">
+                <a:shade val="50000"/>
+              </a:schemeClr>
+            </a:lnRef>
+            <a:fillRef idx="1">
+              <a:schemeClr val="accent1"/>
+            </a:fillRef>
+            <a:effectRef idx="0">
+              <a:schemeClr val="accent1"/>
+            </a:effectRef>
+            <a:fontRef idx="minor">
+              <a:schemeClr val="lt1"/>
+            </a:fontRef>
+          </p:style>
+          <p:txBody>
+            <a:bodyPr rtlCol="0" anchor="ctr"/>
+            <a:lstStyle/>
+            <a:p>
+              <a:pPr algn="ctr"/>
+              <a:r>
+                <a:rPr lang="en-US" altLang="zh-CN" dirty="0">
+                  <a:latin typeface="Arial" panose="020B0604020202020204" pitchFamily="34" charset="0"/>
+                  <a:cs typeface="Arial" panose="020B0604020202020204" pitchFamily="34" charset="0"/>
+                </a:rPr>
+                <a:t>4</a:t>
+              </a:r>
+              <a:endParaRPr lang="zh-CN" altLang="en-US" dirty="0">
+                <a:latin typeface="Arial" panose="020B0604020202020204" pitchFamily="34" charset="0"/>
+                <a:cs typeface="Arial" panose="020B0604020202020204" pitchFamily="34" charset="0"/>
+              </a:endParaRPr>
+            </a:p>
+          </p:txBody>
+        </p:sp>
+        <p:sp>
+          <p:nvSpPr>
+            <p:cNvPr id="7" name="椭圆 6">
+              <a:extLst>
+                <a:ext uri="{FF2B5EF4-FFF2-40B4-BE49-F238E27FC236}">
+                  <a16:creationId xmlns:a16="http://schemas.microsoft.com/office/drawing/2014/main" id="{6E04DAD3-25B8-41CE-ACB6-FAF2F6103899}"/>
+                </a:ext>
+              </a:extLst>
+            </p:cNvPr>
+            <p:cNvSpPr/>
+            <p:nvPr/>
+          </p:nvSpPr>
+          <p:spPr>
+            <a:xfrm>
+              <a:off x="5798057" y="3692633"/>
               <a:ext cx="512447" cy="512447"/>
             </a:xfrm>
             <a:prstGeom prst="ellipse">
@@ -3511,24 +3862,24 @@
         </p:sp>
         <p:cxnSp>
           <p:nvCxnSpPr>
-            <p:cNvPr id="18" name="直接连接符 17">
+            <p:cNvPr id="38" name="直接连接符 37">
               <a:extLst>
                 <a:ext uri="{FF2B5EF4-FFF2-40B4-BE49-F238E27FC236}">
-                  <a16:creationId xmlns:a16="http://schemas.microsoft.com/office/drawing/2014/main" id="{1C1FB3D4-FFA5-4148-AB0A-E9E1838E7914}"/>
+                  <a16:creationId xmlns:a16="http://schemas.microsoft.com/office/drawing/2014/main" id="{272044E5-5A68-46F5-AAC6-D9CA4D5ECC4A}"/>
                 </a:ext>
               </a:extLst>
             </p:cNvPr>
             <p:cNvCxnSpPr>
               <a:cxnSpLocks/>
-              <a:stCxn id="6" idx="0"/>
-              <a:endCxn id="4" idx="3"/>
+              <a:stCxn id="8" idx="5"/>
+              <a:endCxn id="7" idx="0"/>
             </p:cNvCxnSpPr>
             <p:nvPr/>
           </p:nvCxnSpPr>
           <p:spPr>
-            <a:xfrm flipV="1">
-              <a:off x="2737035" y="2385848"/>
-              <a:ext cx="354977" cy="412828"/>
+            <a:xfrm>
+              <a:off x="5723011" y="3137882"/>
+              <a:ext cx="331270" cy="554751"/>
             </a:xfrm>
             <a:prstGeom prst="line">
               <a:avLst/>
@@ -3551,232 +3902,24 @@
         </p:cxnSp>
         <p:cxnSp>
           <p:nvCxnSpPr>
-            <p:cNvPr id="21" name="直接连接符 20">
+            <p:cNvPr id="40" name="直接连接符 39">
               <a:extLst>
                 <a:ext uri="{FF2B5EF4-FFF2-40B4-BE49-F238E27FC236}">
-                  <a16:creationId xmlns:a16="http://schemas.microsoft.com/office/drawing/2014/main" id="{0044F30D-E7B8-4F38-8C35-02679A7ADAA8}"/>
+                  <a16:creationId xmlns:a16="http://schemas.microsoft.com/office/drawing/2014/main" id="{1E167F95-61C9-4276-9211-8D7441DF32D5}"/>
                 </a:ext>
               </a:extLst>
             </p:cNvPr>
             <p:cNvCxnSpPr>
               <a:cxnSpLocks/>
-              <a:stCxn id="4" idx="5"/>
-              <a:endCxn id="8" idx="0"/>
+              <a:stCxn id="8" idx="3"/>
+              <a:endCxn id="5" idx="0"/>
             </p:cNvCxnSpPr>
             <p:nvPr/>
           </p:nvCxnSpPr>
           <p:spPr>
-            <a:xfrm>
-              <a:off x="3454367" y="2385848"/>
-              <a:ext cx="365556" cy="412830"/>
-            </a:xfrm>
-            <a:prstGeom prst="line">
-              <a:avLst/>
-            </a:prstGeom>
-          </p:spPr>
-          <p:style>
-            <a:lnRef idx="1">
-              <a:schemeClr val="accent1"/>
-            </a:lnRef>
-            <a:fillRef idx="0">
-              <a:schemeClr val="accent1"/>
-            </a:fillRef>
-            <a:effectRef idx="0">
-              <a:schemeClr val="accent1"/>
-            </a:effectRef>
-            <a:fontRef idx="minor">
-              <a:schemeClr val="tx1"/>
-            </a:fontRef>
-          </p:style>
-        </p:cxnSp>
-        <p:sp>
-          <p:nvSpPr>
-            <p:cNvPr id="32" name="椭圆 31">
-              <a:extLst>
-                <a:ext uri="{FF2B5EF4-FFF2-40B4-BE49-F238E27FC236}">
-                  <a16:creationId xmlns:a16="http://schemas.microsoft.com/office/drawing/2014/main" id="{88BDC0B2-B219-45F2-B68D-EF8AC6574962}"/>
-                </a:ext>
-              </a:extLst>
-            </p:cNvPr>
-            <p:cNvSpPr/>
-            <p:nvPr/>
-          </p:nvSpPr>
-          <p:spPr>
-            <a:xfrm>
-              <a:off x="5036820" y="1948445"/>
-              <a:ext cx="512447" cy="512447"/>
-            </a:xfrm>
-            <a:prstGeom prst="ellipse">
-              <a:avLst/>
-            </a:prstGeom>
-          </p:spPr>
-          <p:style>
-            <a:lnRef idx="2">
-              <a:schemeClr val="accent1">
-                <a:shade val="50000"/>
-              </a:schemeClr>
-            </a:lnRef>
-            <a:fillRef idx="1">
-              <a:schemeClr val="accent1"/>
-            </a:fillRef>
-            <a:effectRef idx="0">
-              <a:schemeClr val="accent1"/>
-            </a:effectRef>
-            <a:fontRef idx="minor">
-              <a:schemeClr val="lt1"/>
-            </a:fontRef>
-          </p:style>
-          <p:txBody>
-            <a:bodyPr rtlCol="0" anchor="ctr"/>
-            <a:lstStyle/>
-            <a:p>
-              <a:pPr algn="ctr"/>
-              <a:r>
-                <a:rPr lang="en-US" altLang="zh-CN" dirty="0">
-                  <a:latin typeface="Arial" panose="020B0604020202020204" pitchFamily="34" charset="0"/>
-                  <a:cs typeface="Arial" panose="020B0604020202020204" pitchFamily="34" charset="0"/>
-                </a:rPr>
-                <a:t>1</a:t>
-              </a:r>
-              <a:endParaRPr lang="zh-CN" altLang="en-US" dirty="0">
-                <a:latin typeface="Arial" panose="020B0604020202020204" pitchFamily="34" charset="0"/>
-                <a:cs typeface="Arial" panose="020B0604020202020204" pitchFamily="34" charset="0"/>
-              </a:endParaRPr>
-            </a:p>
-          </p:txBody>
-        </p:sp>
-        <p:sp>
-          <p:nvSpPr>
-            <p:cNvPr id="33" name="椭圆 32">
-              <a:extLst>
-                <a:ext uri="{FF2B5EF4-FFF2-40B4-BE49-F238E27FC236}">
-                  <a16:creationId xmlns:a16="http://schemas.microsoft.com/office/drawing/2014/main" id="{72ABC20E-DB42-485A-BB7C-7C6DFE2023C7}"/>
-                </a:ext>
-              </a:extLst>
-            </p:cNvPr>
-            <p:cNvSpPr/>
-            <p:nvPr/>
-          </p:nvSpPr>
-          <p:spPr>
-            <a:xfrm>
-              <a:off x="4500665" y="2798674"/>
-              <a:ext cx="512447" cy="512447"/>
-            </a:xfrm>
-            <a:prstGeom prst="ellipse">
-              <a:avLst/>
-            </a:prstGeom>
-          </p:spPr>
-          <p:style>
-            <a:lnRef idx="2">
-              <a:schemeClr val="accent1">
-                <a:shade val="50000"/>
-              </a:schemeClr>
-            </a:lnRef>
-            <a:fillRef idx="1">
-              <a:schemeClr val="accent1"/>
-            </a:fillRef>
-            <a:effectRef idx="0">
-              <a:schemeClr val="accent1"/>
-            </a:effectRef>
-            <a:fontRef idx="minor">
-              <a:schemeClr val="lt1"/>
-            </a:fontRef>
-          </p:style>
-          <p:txBody>
-            <a:bodyPr rtlCol="0" anchor="ctr"/>
-            <a:lstStyle/>
-            <a:p>
-              <a:pPr algn="ctr"/>
-              <a:r>
-                <a:rPr lang="en-US" altLang="zh-CN" dirty="0">
-                  <a:latin typeface="Arial" panose="020B0604020202020204" pitchFamily="34" charset="0"/>
-                  <a:cs typeface="Arial" panose="020B0604020202020204" pitchFamily="34" charset="0"/>
-                </a:rPr>
-                <a:t>2</a:t>
-              </a:r>
-              <a:endParaRPr lang="zh-CN" altLang="en-US" dirty="0">
-                <a:latin typeface="Arial" panose="020B0604020202020204" pitchFamily="34" charset="0"/>
-                <a:cs typeface="Arial" panose="020B0604020202020204" pitchFamily="34" charset="0"/>
-              </a:endParaRPr>
-            </a:p>
-          </p:txBody>
-        </p:sp>
-        <p:sp>
-          <p:nvSpPr>
-            <p:cNvPr id="34" name="椭圆 33">
-              <a:extLst>
-                <a:ext uri="{FF2B5EF4-FFF2-40B4-BE49-F238E27FC236}">
-                  <a16:creationId xmlns:a16="http://schemas.microsoft.com/office/drawing/2014/main" id="{E9FE81DE-1E2E-4623-9660-E19C4B5B7C04}"/>
-                </a:ext>
-              </a:extLst>
-            </p:cNvPr>
-            <p:cNvSpPr/>
-            <p:nvPr/>
-          </p:nvSpPr>
-          <p:spPr>
-            <a:xfrm>
-              <a:off x="5583553" y="2798676"/>
-              <a:ext cx="512447" cy="512447"/>
-            </a:xfrm>
-            <a:prstGeom prst="ellipse">
-              <a:avLst/>
-            </a:prstGeom>
-          </p:spPr>
-          <p:style>
-            <a:lnRef idx="2">
-              <a:schemeClr val="accent1">
-                <a:shade val="50000"/>
-              </a:schemeClr>
-            </a:lnRef>
-            <a:fillRef idx="1">
-              <a:schemeClr val="accent1"/>
-            </a:fillRef>
-            <a:effectRef idx="0">
-              <a:schemeClr val="accent1"/>
-            </a:effectRef>
-            <a:fontRef idx="minor">
-              <a:schemeClr val="lt1"/>
-            </a:fontRef>
-          </p:style>
-          <p:txBody>
-            <a:bodyPr rtlCol="0" anchor="ctr"/>
-            <a:lstStyle/>
-            <a:p>
-              <a:pPr algn="ctr"/>
-              <a:r>
-                <a:rPr lang="en-US" altLang="zh-CN" dirty="0">
-                  <a:latin typeface="Arial" panose="020B0604020202020204" pitchFamily="34" charset="0"/>
-                  <a:cs typeface="Arial" panose="020B0604020202020204" pitchFamily="34" charset="0"/>
-                </a:rPr>
-                <a:t>3</a:t>
-              </a:r>
-              <a:endParaRPr lang="zh-CN" altLang="en-US" dirty="0">
-                <a:latin typeface="Arial" panose="020B0604020202020204" pitchFamily="34" charset="0"/>
-                <a:cs typeface="Arial" panose="020B0604020202020204" pitchFamily="34" charset="0"/>
-              </a:endParaRPr>
-            </a:p>
-          </p:txBody>
-        </p:sp>
-        <p:cxnSp>
-          <p:nvCxnSpPr>
-            <p:cNvPr id="35" name="直接连接符 34">
-              <a:extLst>
-                <a:ext uri="{FF2B5EF4-FFF2-40B4-BE49-F238E27FC236}">
-                  <a16:creationId xmlns:a16="http://schemas.microsoft.com/office/drawing/2014/main" id="{EC8FB184-FF54-4F36-80B1-4FD246F45B04}"/>
-                </a:ext>
-              </a:extLst>
-            </p:cNvPr>
-            <p:cNvCxnSpPr>
-              <a:cxnSpLocks/>
-              <a:stCxn id="33" idx="0"/>
-              <a:endCxn id="32" idx="3"/>
-            </p:cNvCxnSpPr>
-            <p:nvPr/>
-          </p:nvCxnSpPr>
-          <p:spPr>
-            <a:xfrm flipV="1">
-              <a:off x="4756889" y="2385846"/>
-              <a:ext cx="354977" cy="412828"/>
+            <a:xfrm flipH="1">
+              <a:off x="5359056" y="3137882"/>
+              <a:ext cx="1600" cy="554751"/>
             </a:xfrm>
             <a:prstGeom prst="line">
               <a:avLst/>
@@ -3799,384 +3942,24 @@
         </p:cxnSp>
         <p:cxnSp>
           <p:nvCxnSpPr>
-            <p:cNvPr id="36" name="直接连接符 35">
+            <p:cNvPr id="48" name="直接连接符 47">
               <a:extLst>
                 <a:ext uri="{FF2B5EF4-FFF2-40B4-BE49-F238E27FC236}">
-                  <a16:creationId xmlns:a16="http://schemas.microsoft.com/office/drawing/2014/main" id="{65B6DE1B-3C4F-4AD1-A1CD-EF591DC4D15C}"/>
+                  <a16:creationId xmlns:a16="http://schemas.microsoft.com/office/drawing/2014/main" id="{884B07F7-D7CF-4CE5-B37A-8925145C08EE}"/>
                 </a:ext>
               </a:extLst>
             </p:cNvPr>
             <p:cNvCxnSpPr>
               <a:cxnSpLocks/>
-              <a:stCxn id="32" idx="5"/>
-              <a:endCxn id="34" idx="0"/>
+              <a:stCxn id="6" idx="5"/>
+              <a:endCxn id="3" idx="0"/>
             </p:cNvCxnSpPr>
             <p:nvPr/>
           </p:nvCxnSpPr>
           <p:spPr>
             <a:xfrm>
-              <a:off x="5474221" y="2385846"/>
-              <a:ext cx="365556" cy="412830"/>
-            </a:xfrm>
-            <a:prstGeom prst="line">
-              <a:avLst/>
-            </a:prstGeom>
-          </p:spPr>
-          <p:style>
-            <a:lnRef idx="1">
-              <a:schemeClr val="accent1"/>
-            </a:lnRef>
-            <a:fillRef idx="0">
-              <a:schemeClr val="accent1"/>
-            </a:fillRef>
-            <a:effectRef idx="0">
-              <a:schemeClr val="accent1"/>
-            </a:effectRef>
-            <a:fontRef idx="minor">
-              <a:schemeClr val="tx1"/>
-            </a:fontRef>
-          </p:style>
-        </p:cxnSp>
-        <p:sp>
-          <p:nvSpPr>
-            <p:cNvPr id="37" name="椭圆 36">
-              <a:extLst>
-                <a:ext uri="{FF2B5EF4-FFF2-40B4-BE49-F238E27FC236}">
-                  <a16:creationId xmlns:a16="http://schemas.microsoft.com/office/drawing/2014/main" id="{825798A3-786E-47CF-8FE3-E4229290687B}"/>
-                </a:ext>
-              </a:extLst>
-            </p:cNvPr>
-            <p:cNvSpPr/>
-            <p:nvPr/>
-          </p:nvSpPr>
-          <p:spPr>
-            <a:xfrm>
-              <a:off x="3016966" y="3593981"/>
-              <a:ext cx="512447" cy="512447"/>
-            </a:xfrm>
-            <a:prstGeom prst="ellipse">
-              <a:avLst/>
-            </a:prstGeom>
-          </p:spPr>
-          <p:style>
-            <a:lnRef idx="2">
-              <a:schemeClr val="accent1">
-                <a:shade val="50000"/>
-              </a:schemeClr>
-            </a:lnRef>
-            <a:fillRef idx="1">
-              <a:schemeClr val="accent1"/>
-            </a:fillRef>
-            <a:effectRef idx="0">
-              <a:schemeClr val="accent1"/>
-            </a:effectRef>
-            <a:fontRef idx="minor">
-              <a:schemeClr val="lt1"/>
-            </a:fontRef>
-          </p:style>
-          <p:txBody>
-            <a:bodyPr rtlCol="0" anchor="ctr"/>
-            <a:lstStyle/>
-            <a:p>
-              <a:pPr algn="ctr"/>
-              <a:r>
-                <a:rPr lang="en-US" altLang="zh-CN" dirty="0">
-                  <a:latin typeface="Arial" panose="020B0604020202020204" pitchFamily="34" charset="0"/>
-                  <a:cs typeface="Arial" panose="020B0604020202020204" pitchFamily="34" charset="0"/>
-                </a:rPr>
-                <a:t>1</a:t>
-              </a:r>
-              <a:endParaRPr lang="zh-CN" altLang="en-US" dirty="0">
-                <a:latin typeface="Arial" panose="020B0604020202020204" pitchFamily="34" charset="0"/>
-                <a:cs typeface="Arial" panose="020B0604020202020204" pitchFamily="34" charset="0"/>
-              </a:endParaRPr>
-            </a:p>
-          </p:txBody>
-        </p:sp>
-        <p:sp>
-          <p:nvSpPr>
-            <p:cNvPr id="39" name="椭圆 38">
-              <a:extLst>
-                <a:ext uri="{FF2B5EF4-FFF2-40B4-BE49-F238E27FC236}">
-                  <a16:creationId xmlns:a16="http://schemas.microsoft.com/office/drawing/2014/main" id="{FF111195-5E78-4294-AD3B-B3CDD24286EE}"/>
-                </a:ext>
-              </a:extLst>
-            </p:cNvPr>
-            <p:cNvSpPr/>
-            <p:nvPr/>
-          </p:nvSpPr>
-          <p:spPr>
-            <a:xfrm>
-              <a:off x="3563699" y="4444212"/>
-              <a:ext cx="512447" cy="512447"/>
-            </a:xfrm>
-            <a:prstGeom prst="ellipse">
-              <a:avLst/>
-            </a:prstGeom>
-          </p:spPr>
-          <p:style>
-            <a:lnRef idx="2">
-              <a:schemeClr val="accent1">
-                <a:shade val="50000"/>
-              </a:schemeClr>
-            </a:lnRef>
-            <a:fillRef idx="1">
-              <a:schemeClr val="accent1"/>
-            </a:fillRef>
-            <a:effectRef idx="0">
-              <a:schemeClr val="accent1"/>
-            </a:effectRef>
-            <a:fontRef idx="minor">
-              <a:schemeClr val="lt1"/>
-            </a:fontRef>
-          </p:style>
-          <p:txBody>
-            <a:bodyPr rtlCol="0" anchor="ctr"/>
-            <a:lstStyle/>
-            <a:p>
-              <a:pPr algn="ctr"/>
-              <a:r>
-                <a:rPr lang="en-US" altLang="zh-CN" dirty="0">
-                  <a:latin typeface="Arial" panose="020B0604020202020204" pitchFamily="34" charset="0"/>
-                  <a:cs typeface="Arial" panose="020B0604020202020204" pitchFamily="34" charset="0"/>
-                </a:rPr>
-                <a:t>3</a:t>
-              </a:r>
-              <a:endParaRPr lang="zh-CN" altLang="en-US" dirty="0">
-                <a:latin typeface="Arial" panose="020B0604020202020204" pitchFamily="34" charset="0"/>
-                <a:cs typeface="Arial" panose="020B0604020202020204" pitchFamily="34" charset="0"/>
-              </a:endParaRPr>
-            </a:p>
-          </p:txBody>
-        </p:sp>
-        <p:cxnSp>
-          <p:nvCxnSpPr>
-            <p:cNvPr id="41" name="直接连接符 40">
-              <a:extLst>
-                <a:ext uri="{FF2B5EF4-FFF2-40B4-BE49-F238E27FC236}">
-                  <a16:creationId xmlns:a16="http://schemas.microsoft.com/office/drawing/2014/main" id="{21C8CBCE-8C50-4653-BD36-D1FFD116E8C6}"/>
-                </a:ext>
-              </a:extLst>
-            </p:cNvPr>
-            <p:cNvCxnSpPr>
-              <a:cxnSpLocks/>
-              <a:stCxn id="37" idx="5"/>
-              <a:endCxn id="39" idx="0"/>
-            </p:cNvCxnSpPr>
-            <p:nvPr/>
-          </p:nvCxnSpPr>
-          <p:spPr>
-            <a:xfrm>
-              <a:off x="3454367" y="4031382"/>
-              <a:ext cx="365556" cy="412830"/>
-            </a:xfrm>
-            <a:prstGeom prst="line">
-              <a:avLst/>
-            </a:prstGeom>
-          </p:spPr>
-          <p:style>
-            <a:lnRef idx="1">
-              <a:schemeClr val="accent1"/>
-            </a:lnRef>
-            <a:fillRef idx="0">
-              <a:schemeClr val="accent1"/>
-            </a:fillRef>
-            <a:effectRef idx="0">
-              <a:schemeClr val="accent1"/>
-            </a:effectRef>
-            <a:fontRef idx="minor">
-              <a:schemeClr val="tx1"/>
-            </a:fontRef>
-          </p:style>
-        </p:cxnSp>
-        <p:sp>
-          <p:nvSpPr>
-            <p:cNvPr id="42" name="椭圆 41">
-              <a:extLst>
-                <a:ext uri="{FF2B5EF4-FFF2-40B4-BE49-F238E27FC236}">
-                  <a16:creationId xmlns:a16="http://schemas.microsoft.com/office/drawing/2014/main" id="{6AE2246E-F647-4AE4-93FC-63A7468255F5}"/>
-                </a:ext>
-              </a:extLst>
-            </p:cNvPr>
-            <p:cNvSpPr/>
-            <p:nvPr/>
-          </p:nvSpPr>
-          <p:spPr>
-            <a:xfrm>
-              <a:off x="5036820" y="3593981"/>
-              <a:ext cx="512447" cy="512447"/>
-            </a:xfrm>
-            <a:prstGeom prst="ellipse">
-              <a:avLst/>
-            </a:prstGeom>
-          </p:spPr>
-          <p:style>
-            <a:lnRef idx="2">
-              <a:schemeClr val="accent1">
-                <a:shade val="50000"/>
-              </a:schemeClr>
-            </a:lnRef>
-            <a:fillRef idx="1">
-              <a:schemeClr val="accent1"/>
-            </a:fillRef>
-            <a:effectRef idx="0">
-              <a:schemeClr val="accent1"/>
-            </a:effectRef>
-            <a:fontRef idx="minor">
-              <a:schemeClr val="lt1"/>
-            </a:fontRef>
-          </p:style>
-          <p:txBody>
-            <a:bodyPr rtlCol="0" anchor="ctr"/>
-            <a:lstStyle/>
-            <a:p>
-              <a:pPr algn="ctr"/>
-              <a:r>
-                <a:rPr lang="en-US" altLang="zh-CN" dirty="0">
-                  <a:latin typeface="Arial" panose="020B0604020202020204" pitchFamily="34" charset="0"/>
-                  <a:cs typeface="Arial" panose="020B0604020202020204" pitchFamily="34" charset="0"/>
-                </a:rPr>
-                <a:t>1</a:t>
-              </a:r>
-              <a:endParaRPr lang="zh-CN" altLang="en-US" dirty="0">
-                <a:latin typeface="Arial" panose="020B0604020202020204" pitchFamily="34" charset="0"/>
-                <a:cs typeface="Arial" panose="020B0604020202020204" pitchFamily="34" charset="0"/>
-              </a:endParaRPr>
-            </a:p>
-          </p:txBody>
-        </p:sp>
-        <p:sp>
-          <p:nvSpPr>
-            <p:cNvPr id="43" name="椭圆 42">
-              <a:extLst>
-                <a:ext uri="{FF2B5EF4-FFF2-40B4-BE49-F238E27FC236}">
-                  <a16:creationId xmlns:a16="http://schemas.microsoft.com/office/drawing/2014/main" id="{6C581980-9228-4EEA-99D6-1B77D290588D}"/>
-                </a:ext>
-              </a:extLst>
-            </p:cNvPr>
-            <p:cNvSpPr/>
-            <p:nvPr/>
-          </p:nvSpPr>
-          <p:spPr>
-            <a:xfrm>
-              <a:off x="4500665" y="4444210"/>
-              <a:ext cx="512447" cy="512447"/>
-            </a:xfrm>
-            <a:prstGeom prst="ellipse">
-              <a:avLst/>
-            </a:prstGeom>
-          </p:spPr>
-          <p:style>
-            <a:lnRef idx="2">
-              <a:schemeClr val="accent1">
-                <a:shade val="50000"/>
-              </a:schemeClr>
-            </a:lnRef>
-            <a:fillRef idx="1">
-              <a:schemeClr val="accent1"/>
-            </a:fillRef>
-            <a:effectRef idx="0">
-              <a:schemeClr val="accent1"/>
-            </a:effectRef>
-            <a:fontRef idx="minor">
-              <a:schemeClr val="lt1"/>
-            </a:fontRef>
-          </p:style>
-          <p:txBody>
-            <a:bodyPr rtlCol="0" anchor="ctr"/>
-            <a:lstStyle/>
-            <a:p>
-              <a:pPr algn="ctr"/>
-              <a:r>
-                <a:rPr lang="en-US" altLang="zh-CN" dirty="0">
-                  <a:latin typeface="Arial" panose="020B0604020202020204" pitchFamily="34" charset="0"/>
-                  <a:cs typeface="Arial" panose="020B0604020202020204" pitchFamily="34" charset="0"/>
-                </a:rPr>
-                <a:t>2</a:t>
-              </a:r>
-              <a:endParaRPr lang="zh-CN" altLang="en-US" dirty="0">
-                <a:latin typeface="Arial" panose="020B0604020202020204" pitchFamily="34" charset="0"/>
-                <a:cs typeface="Arial" panose="020B0604020202020204" pitchFamily="34" charset="0"/>
-              </a:endParaRPr>
-            </a:p>
-          </p:txBody>
-        </p:sp>
-        <p:sp>
-          <p:nvSpPr>
-            <p:cNvPr id="44" name="椭圆 43">
-              <a:extLst>
-                <a:ext uri="{FF2B5EF4-FFF2-40B4-BE49-F238E27FC236}">
-                  <a16:creationId xmlns:a16="http://schemas.microsoft.com/office/drawing/2014/main" id="{DCBBBE95-4249-41FC-81F4-D0BE1D78D8CE}"/>
-                </a:ext>
-              </a:extLst>
-            </p:cNvPr>
-            <p:cNvSpPr/>
-            <p:nvPr/>
-          </p:nvSpPr>
-          <p:spPr>
-            <a:xfrm>
-              <a:off x="5583553" y="4444212"/>
-              <a:ext cx="512447" cy="512447"/>
-            </a:xfrm>
-            <a:prstGeom prst="ellipse">
-              <a:avLst/>
-            </a:prstGeom>
-          </p:spPr>
-          <p:style>
-            <a:lnRef idx="2">
-              <a:schemeClr val="accent1">
-                <a:shade val="50000"/>
-              </a:schemeClr>
-            </a:lnRef>
-            <a:fillRef idx="1">
-              <a:schemeClr val="accent1"/>
-            </a:fillRef>
-            <a:effectRef idx="0">
-              <a:schemeClr val="accent1"/>
-            </a:effectRef>
-            <a:fontRef idx="minor">
-              <a:schemeClr val="lt1"/>
-            </a:fontRef>
-          </p:style>
-          <p:txBody>
-            <a:bodyPr rtlCol="0" anchor="ctr"/>
-            <a:lstStyle/>
-            <a:p>
-              <a:pPr algn="ctr"/>
-              <a:r>
-                <a:rPr lang="en-US" altLang="zh-CN" dirty="0">
-                  <a:latin typeface="Arial" panose="020B0604020202020204" pitchFamily="34" charset="0"/>
-                  <a:cs typeface="Arial" panose="020B0604020202020204" pitchFamily="34" charset="0"/>
-                </a:rPr>
-                <a:t>3</a:t>
-              </a:r>
-              <a:endParaRPr lang="zh-CN" altLang="en-US" dirty="0">
-                <a:latin typeface="Arial" panose="020B0604020202020204" pitchFamily="34" charset="0"/>
-                <a:cs typeface="Arial" panose="020B0604020202020204" pitchFamily="34" charset="0"/>
-              </a:endParaRPr>
-            </a:p>
-          </p:txBody>
-        </p:sp>
-        <p:cxnSp>
-          <p:nvCxnSpPr>
-            <p:cNvPr id="45" name="直接连接符 44">
-              <a:extLst>
-                <a:ext uri="{FF2B5EF4-FFF2-40B4-BE49-F238E27FC236}">
-                  <a16:creationId xmlns:a16="http://schemas.microsoft.com/office/drawing/2014/main" id="{7AD27620-A08C-4D5C-9F44-202905B7364B}"/>
-                </a:ext>
-              </a:extLst>
-            </p:cNvPr>
-            <p:cNvCxnSpPr>
-              <a:cxnSpLocks/>
-              <a:stCxn id="43" idx="0"/>
-              <a:endCxn id="42" idx="3"/>
-            </p:cNvCxnSpPr>
-            <p:nvPr/>
-          </p:nvCxnSpPr>
-          <p:spPr>
-            <a:xfrm flipV="1">
-              <a:off x="4756889" y="4031382"/>
-              <a:ext cx="354977" cy="412828"/>
+              <a:off x="4640123" y="3137880"/>
+              <a:ext cx="75046" cy="554753"/>
             </a:xfrm>
             <a:prstGeom prst="line">
               <a:avLst/>
@@ -4199,24 +3982,24 @@
         </p:cxnSp>
         <p:cxnSp>
           <p:nvCxnSpPr>
-            <p:cNvPr id="46" name="直接连接符 45">
+            <p:cNvPr id="50" name="直接连接符 49">
               <a:extLst>
                 <a:ext uri="{FF2B5EF4-FFF2-40B4-BE49-F238E27FC236}">
-                  <a16:creationId xmlns:a16="http://schemas.microsoft.com/office/drawing/2014/main" id="{1A1DE20E-EF90-43A3-9961-D011BEEB6830}"/>
+                  <a16:creationId xmlns:a16="http://schemas.microsoft.com/office/drawing/2014/main" id="{099193C8-A022-4D48-8C02-E0052AC1EE76}"/>
                 </a:ext>
               </a:extLst>
             </p:cNvPr>
             <p:cNvCxnSpPr>
               <a:cxnSpLocks/>
-              <a:stCxn id="42" idx="5"/>
-              <a:endCxn id="44" idx="0"/>
+              <a:stCxn id="6" idx="3"/>
+              <a:endCxn id="2" idx="0"/>
             </p:cNvCxnSpPr>
             <p:nvPr/>
           </p:nvCxnSpPr>
           <p:spPr>
-            <a:xfrm>
-              <a:off x="5474221" y="4031382"/>
-              <a:ext cx="365556" cy="412830"/>
+            <a:xfrm flipH="1">
+              <a:off x="3951451" y="3137880"/>
+              <a:ext cx="326317" cy="554753"/>
             </a:xfrm>
             <a:prstGeom prst="line">
               <a:avLst/>
@@ -4237,120 +4020,47 @@
             </a:fontRef>
           </p:style>
         </p:cxnSp>
-        <p:sp>
-          <p:nvSpPr>
-            <p:cNvPr id="47" name="文本框 46">
+        <p:cxnSp>
+          <p:nvCxnSpPr>
+            <p:cNvPr id="19" name="直接连接符 18">
               <a:extLst>
                 <a:ext uri="{FF2B5EF4-FFF2-40B4-BE49-F238E27FC236}">
-                  <a16:creationId xmlns:a16="http://schemas.microsoft.com/office/drawing/2014/main" id="{DC170A73-20A5-4E3B-B662-4AD3C41EF8E0}"/>
+                  <a16:creationId xmlns:a16="http://schemas.microsoft.com/office/drawing/2014/main" id="{EF0B6F68-1C5B-4059-BF59-74728AC7CAA9}"/>
                 </a:ext>
               </a:extLst>
             </p:cNvPr>
-            <p:cNvSpPr txBox="1"/>
-            <p:nvPr/>
-          </p:nvSpPr>
-          <p:spPr>
-            <a:xfrm>
-              <a:off x="6640552" y="2299872"/>
-              <a:ext cx="889987" cy="584775"/>
-            </a:xfrm>
-            <a:prstGeom prst="rect">
-              <a:avLst/>
-            </a:prstGeom>
-            <a:noFill/>
-          </p:spPr>
-          <p:txBody>
-            <a:bodyPr wrap="none" rtlCol="0">
-              <a:spAutoFit/>
-            </a:bodyPr>
-            <a:lstStyle/>
-            <a:p>
-              <a:r>
-                <a:rPr lang="en-US" altLang="zh-CN" sz="3200" dirty="0">
-                  <a:latin typeface="Arial" panose="020B0604020202020204" pitchFamily="34" charset="0"/>
-                  <a:cs typeface="Arial" panose="020B0604020202020204" pitchFamily="34" charset="0"/>
-                </a:rPr>
-                <a:t>true</a:t>
-              </a:r>
-              <a:endParaRPr lang="zh-CN" altLang="en-US" sz="3200" dirty="0">
-                <a:latin typeface="Arial" panose="020B0604020202020204" pitchFamily="34" charset="0"/>
-                <a:cs typeface="Arial" panose="020B0604020202020204" pitchFamily="34" charset="0"/>
-              </a:endParaRPr>
-            </a:p>
-          </p:txBody>
-        </p:sp>
-        <p:sp>
-          <p:nvSpPr>
-            <p:cNvPr id="49" name="文本框 48">
-              <a:extLst>
-                <a:ext uri="{FF2B5EF4-FFF2-40B4-BE49-F238E27FC236}">
-                  <a16:creationId xmlns:a16="http://schemas.microsoft.com/office/drawing/2014/main" id="{060CE74D-5835-471A-A643-491D2B3042DD}"/>
-                </a:ext>
-              </a:extLst>
-            </p:cNvPr>
-            <p:cNvSpPr txBox="1"/>
-            <p:nvPr/>
-          </p:nvSpPr>
-          <p:spPr>
-            <a:xfrm>
-              <a:off x="6645613" y="4106428"/>
-              <a:ext cx="1050288" cy="584775"/>
-            </a:xfrm>
-            <a:prstGeom prst="rect">
-              <a:avLst/>
-            </a:prstGeom>
-            <a:noFill/>
-          </p:spPr>
-          <p:txBody>
-            <a:bodyPr wrap="none" rtlCol="0">
-              <a:spAutoFit/>
-            </a:bodyPr>
-            <a:lstStyle/>
-            <a:p>
-              <a:r>
-                <a:rPr lang="en-US" altLang="zh-CN" sz="3200" dirty="0">
-                  <a:latin typeface="Arial" panose="020B0604020202020204" pitchFamily="34" charset="0"/>
-                  <a:cs typeface="Arial" panose="020B0604020202020204" pitchFamily="34" charset="0"/>
-                </a:rPr>
-                <a:t>false</a:t>
-              </a:r>
-              <a:endParaRPr lang="zh-CN" altLang="en-US" sz="3200" dirty="0">
-                <a:latin typeface="Arial" panose="020B0604020202020204" pitchFamily="34" charset="0"/>
-                <a:cs typeface="Arial" panose="020B0604020202020204" pitchFamily="34" charset="0"/>
-              </a:endParaRPr>
-            </a:p>
-          </p:txBody>
-        </p:sp>
-        <p:cxnSp>
-          <p:nvCxnSpPr>
-            <p:cNvPr id="51" name="直接连接符 50">
-              <a:extLst>
-                <a:ext uri="{FF2B5EF4-FFF2-40B4-BE49-F238E27FC236}">
-                  <a16:creationId xmlns:a16="http://schemas.microsoft.com/office/drawing/2014/main" id="{A0DB07B8-CE90-44D5-A149-914B179226BD}"/>
-                </a:ext>
-              </a:extLst>
-            </p:cNvPr>
-            <p:cNvCxnSpPr/>
+            <p:cNvCxnSpPr>
+              <a:cxnSpLocks/>
+            </p:cNvCxnSpPr>
             <p:nvPr/>
           </p:nvCxnSpPr>
           <p:spPr>
             <a:xfrm>
-              <a:off x="1959866" y="3429000"/>
-              <a:ext cx="6087020" cy="0"/>
+              <a:off x="4971392" y="1371600"/>
+              <a:ext cx="0" cy="3123704"/>
             </a:xfrm>
             <a:prstGeom prst="line">
               <a:avLst/>
             </a:prstGeom>
+            <a:ln w="9525" cap="flat" cmpd="sng" algn="ctr">
+              <a:solidFill>
+                <a:schemeClr val="dk1"/>
+              </a:solidFill>
+              <a:prstDash val="dash"/>
+              <a:round/>
+              <a:headEnd type="none" w="med" len="med"/>
+              <a:tailEnd type="none" w="med" len="med"/>
+            </a:ln>
           </p:spPr>
           <p:style>
-            <a:lnRef idx="1">
-              <a:schemeClr val="accent1"/>
+            <a:lnRef idx="0">
+              <a:scrgbClr r="0" g="0" b="0"/>
             </a:lnRef>
             <a:fillRef idx="0">
-              <a:schemeClr val="accent1"/>
+              <a:scrgbClr r="0" g="0" b="0"/>
             </a:fillRef>
             <a:effectRef idx="0">
-              <a:schemeClr val="accent1"/>
+              <a:scrgbClr r="0" g="0" b="0"/>
             </a:effectRef>
             <a:fontRef idx="minor">
               <a:schemeClr val="tx1"/>

</xml_diff>